<commit_message>
Duplicate image report fix and duplicate test image extraction cleanup.
</commit_message>
<xml_diff>
--- a/java/TikaImageDetection/src/test/resources/data/test-tika-image-extraction.pptx
+++ b/java/TikaImageDetection/src/test/resources/data/test-tika-image-extraction.pptx
@@ -8,7 +8,8 @@
     <p:sldId id="256" r:id="rId2"/>
     <p:sldId id="257" r:id="rId3"/>
     <p:sldId id="258" r:id="rId4"/>
-    <p:sldId id="259" r:id="rId5"/>
+    <p:sldId id="261" r:id="rId5"/>
+    <p:sldId id="259" r:id="rId6"/>
   </p:sldIdLst>
   <p:sldSz cx="12192000" cy="6858000"/>
   <p:notesSz cx="6858000" cy="9144000"/>
@@ -123,43 +124,6 @@
 </p1510:revInfo>
 </file>
 
-<file path=ppt/changesInfos/changesInfo1.xml><?xml version="1.0" encoding="utf-8"?>
-<pc:chgInfo xmlns:a="http://schemas.openxmlformats.org/drawingml/2006/main" xmlns:r="http://schemas.openxmlformats.org/officeDocument/2006/relationships" xmlns:ac="http://schemas.microsoft.com/office/drawing/2013/main/command" xmlns:pc="http://schemas.microsoft.com/office/powerpoint/2013/main/command">
-  <pc:docChgLst>
-    <pc:chgData name="Howard Huang" userId="5ebeab73-86d5-4c2f-9d85-ffcb6dc2bb3f" providerId="ADAL" clId="{975A5035-9CD6-4F30-A309-373D075BE9F0}"/>
-    <pc:docChg chg="modSld">
-      <pc:chgData name="Howard Huang" userId="5ebeab73-86d5-4c2f-9d85-ffcb6dc2bb3f" providerId="ADAL" clId="{975A5035-9CD6-4F30-A309-373D075BE9F0}" dt="2021-08-04T21:48:31.309" v="11" actId="1076"/>
-      <pc:docMkLst>
-        <pc:docMk/>
-      </pc:docMkLst>
-      <pc:sldChg chg="addSp modSp mod">
-        <pc:chgData name="Howard Huang" userId="5ebeab73-86d5-4c2f-9d85-ffcb6dc2bb3f" providerId="ADAL" clId="{975A5035-9CD6-4F30-A309-373D075BE9F0}" dt="2021-08-04T21:48:31.309" v="11" actId="1076"/>
-        <pc:sldMkLst>
-          <pc:docMk/>
-          <pc:sldMk cId="3628387262" sldId="259"/>
-        </pc:sldMkLst>
-        <pc:picChg chg="mod">
-          <ac:chgData name="Howard Huang" userId="5ebeab73-86d5-4c2f-9d85-ffcb6dc2bb3f" providerId="ADAL" clId="{975A5035-9CD6-4F30-A309-373D075BE9F0}" dt="2021-08-04T21:48:28.872" v="10" actId="1076"/>
-          <ac:picMkLst>
-            <pc:docMk/>
-            <pc:sldMk cId="3628387262" sldId="259"/>
-            <ac:picMk id="5" creationId="{4EDB8F79-1780-4A77-B435-87282C0B1E54}"/>
-          </ac:picMkLst>
-        </pc:picChg>
-        <pc:picChg chg="add mod">
-          <ac:chgData name="Howard Huang" userId="5ebeab73-86d5-4c2f-9d85-ffcb6dc2bb3f" providerId="ADAL" clId="{975A5035-9CD6-4F30-A309-373D075BE9F0}" dt="2021-08-04T21:48:31.309" v="11" actId="1076"/>
-          <ac:picMkLst>
-            <pc:docMk/>
-            <pc:sldMk cId="3628387262" sldId="259"/>
-            <ac:picMk id="1026" creationId="{D39FE0B0-FAA8-494C-8D44-B62E0CB079C1}"/>
-          </ac:picMkLst>
-        </pc:picChg>
-      </pc:sldChg>
-    </pc:docChg>
-  </pc:docChgLst>
-</pc:chgInfo>
-</file>
-
 <file path=ppt/slideLayouts/slideLayout1.xml><?xml version="1.0" encoding="utf-8"?>
 <p:sldLayout xmlns:a="http://schemas.openxmlformats.org/drawingml/2006/main" xmlns:r="http://schemas.openxmlformats.org/officeDocument/2006/relationships" xmlns:p="http://schemas.openxmlformats.org/presentationml/2006/main" type="title" preserve="1">
   <p:cSld name="Title Slide">
@@ -307,7 +271,7 @@
           <a:p>
             <a:fld id="{782D1E4F-C11F-4B0B-B9E4-84914503D5D4}" type="datetimeFigureOut">
               <a:rPr lang="en-US" smtClean="0"/>
-              <a:t>8/4/2021</a:t>
+              <a:t>8/13/2021</a:t>
             </a:fld>
             <a:endParaRPr lang="en-US"/>
           </a:p>
@@ -505,7 +469,7 @@
           <a:p>
             <a:fld id="{782D1E4F-C11F-4B0B-B9E4-84914503D5D4}" type="datetimeFigureOut">
               <a:rPr lang="en-US" smtClean="0"/>
-              <a:t>8/4/2021</a:t>
+              <a:t>8/13/2021</a:t>
             </a:fld>
             <a:endParaRPr lang="en-US"/>
           </a:p>
@@ -713,7 +677,7 @@
           <a:p>
             <a:fld id="{782D1E4F-C11F-4B0B-B9E4-84914503D5D4}" type="datetimeFigureOut">
               <a:rPr lang="en-US" smtClean="0"/>
-              <a:t>8/4/2021</a:t>
+              <a:t>8/13/2021</a:t>
             </a:fld>
             <a:endParaRPr lang="en-US"/>
           </a:p>
@@ -911,7 +875,7 @@
           <a:p>
             <a:fld id="{782D1E4F-C11F-4B0B-B9E4-84914503D5D4}" type="datetimeFigureOut">
               <a:rPr lang="en-US" smtClean="0"/>
-              <a:t>8/4/2021</a:t>
+              <a:t>8/13/2021</a:t>
             </a:fld>
             <a:endParaRPr lang="en-US"/>
           </a:p>
@@ -1186,7 +1150,7 @@
           <a:p>
             <a:fld id="{782D1E4F-C11F-4B0B-B9E4-84914503D5D4}" type="datetimeFigureOut">
               <a:rPr lang="en-US" smtClean="0"/>
-              <a:t>8/4/2021</a:t>
+              <a:t>8/13/2021</a:t>
             </a:fld>
             <a:endParaRPr lang="en-US"/>
           </a:p>
@@ -1451,7 +1415,7 @@
           <a:p>
             <a:fld id="{782D1E4F-C11F-4B0B-B9E4-84914503D5D4}" type="datetimeFigureOut">
               <a:rPr lang="en-US" smtClean="0"/>
-              <a:t>8/4/2021</a:t>
+              <a:t>8/13/2021</a:t>
             </a:fld>
             <a:endParaRPr lang="en-US"/>
           </a:p>
@@ -1863,7 +1827,7 @@
           <a:p>
             <a:fld id="{782D1E4F-C11F-4B0B-B9E4-84914503D5D4}" type="datetimeFigureOut">
               <a:rPr lang="en-US" smtClean="0"/>
-              <a:t>8/4/2021</a:t>
+              <a:t>8/13/2021</a:t>
             </a:fld>
             <a:endParaRPr lang="en-US"/>
           </a:p>
@@ -2004,7 +1968,7 @@
           <a:p>
             <a:fld id="{782D1E4F-C11F-4B0B-B9E4-84914503D5D4}" type="datetimeFigureOut">
               <a:rPr lang="en-US" smtClean="0"/>
-              <a:t>8/4/2021</a:t>
+              <a:t>8/13/2021</a:t>
             </a:fld>
             <a:endParaRPr lang="en-US"/>
           </a:p>
@@ -2117,7 +2081,7 @@
           <a:p>
             <a:fld id="{782D1E4F-C11F-4B0B-B9E4-84914503D5D4}" type="datetimeFigureOut">
               <a:rPr lang="en-US" smtClean="0"/>
-              <a:t>8/4/2021</a:t>
+              <a:t>8/13/2021</a:t>
             </a:fld>
             <a:endParaRPr lang="en-US"/>
           </a:p>
@@ -2428,7 +2392,7 @@
           <a:p>
             <a:fld id="{782D1E4F-C11F-4B0B-B9E4-84914503D5D4}" type="datetimeFigureOut">
               <a:rPr lang="en-US" smtClean="0"/>
-              <a:t>8/4/2021</a:t>
+              <a:t>8/13/2021</a:t>
             </a:fld>
             <a:endParaRPr lang="en-US"/>
           </a:p>
@@ -2716,7 +2680,7 @@
           <a:p>
             <a:fld id="{782D1E4F-C11F-4B0B-B9E4-84914503D5D4}" type="datetimeFigureOut">
               <a:rPr lang="en-US" smtClean="0"/>
-              <a:t>8/4/2021</a:t>
+              <a:t>8/13/2021</a:t>
             </a:fld>
             <a:endParaRPr lang="en-US"/>
           </a:p>
@@ -2957,7 +2921,7 @@
           <a:p>
             <a:fld id="{782D1E4F-C11F-4B0B-B9E4-84914503D5D4}" type="datetimeFigureOut">
               <a:rPr lang="en-US" smtClean="0"/>
-              <a:t>8/4/2021</a:t>
+              <a:t>8/13/2021</a:t>
             </a:fld>
             <a:endParaRPr lang="en-US"/>
           </a:p>
@@ -3396,8 +3360,8 @@
         </p:blipFill>
         <p:spPr>
           <a:xfrm>
-            <a:off x="950490" y="0"/>
-            <a:ext cx="10291020" cy="6858000"/>
+            <a:off x="1828800" y="552851"/>
+            <a:ext cx="8788980" cy="5857031"/>
           </a:xfrm>
           <a:prstGeom prst="rect">
             <a:avLst/>
@@ -3436,10 +3400,10 @@
       </p:grpSpPr>
       <p:pic>
         <p:nvPicPr>
-          <p:cNvPr id="8" name="Picture 7">
-            <a:extLst>
-              <a:ext uri="{FF2B5EF4-FFF2-40B4-BE49-F238E27FC236}">
-                <a16:creationId xmlns:a16="http://schemas.microsoft.com/office/drawing/2014/main" id="{74F9FF9A-9C7B-4F27-A6F3-2D0318AC9CA3}"/>
+          <p:cNvPr id="4" name="Picture 3">
+            <a:extLst>
+              <a:ext uri="{FF2B5EF4-FFF2-40B4-BE49-F238E27FC236}">
+                <a16:creationId xmlns:a16="http://schemas.microsoft.com/office/drawing/2014/main" id="{31F6C226-4245-44F0-86BC-B951D1FD0412}"/>
               </a:ext>
             </a:extLst>
           </p:cNvPr>
@@ -3456,8 +3420,8 @@
         </p:blipFill>
         <p:spPr>
           <a:xfrm>
-            <a:off x="6191140" y="1457696"/>
-            <a:ext cx="5916223" cy="3942608"/>
+            <a:off x="822599" y="284615"/>
+            <a:ext cx="4393559" cy="2927895"/>
           </a:xfrm>
           <a:prstGeom prst="rect">
             <a:avLst/>
@@ -3466,10 +3430,10 @@
       </p:pic>
       <p:pic>
         <p:nvPicPr>
-          <p:cNvPr id="9" name="Picture 8">
-            <a:extLst>
-              <a:ext uri="{FF2B5EF4-FFF2-40B4-BE49-F238E27FC236}">
-                <a16:creationId xmlns:a16="http://schemas.microsoft.com/office/drawing/2014/main" id="{86965712-DAC6-4958-844C-BA1566013E26}"/>
+          <p:cNvPr id="5" name="Picture 4">
+            <a:extLst>
+              <a:ext uri="{FF2B5EF4-FFF2-40B4-BE49-F238E27FC236}">
+                <a16:creationId xmlns:a16="http://schemas.microsoft.com/office/drawing/2014/main" id="{0A41D4CC-BD27-4CF1-B1A4-E539D25D7AE6}"/>
               </a:ext>
             </a:extLst>
           </p:cNvPr>
@@ -3486,12 +3450,81 @@
         </p:blipFill>
         <p:spPr>
           <a:xfrm>
-            <a:off x="274917" y="1457696"/>
-            <a:ext cx="5916223" cy="3942608"/>
+            <a:off x="6835354" y="284615"/>
+            <a:ext cx="4393559" cy="2927895"/>
           </a:xfrm>
           <a:prstGeom prst="rect">
             <a:avLst/>
           </a:prstGeom>
+        </p:spPr>
+      </p:pic>
+      <p:pic>
+        <p:nvPicPr>
+          <p:cNvPr id="6" name="Picture 5">
+            <a:extLst>
+              <a:ext uri="{FF2B5EF4-FFF2-40B4-BE49-F238E27FC236}">
+                <a16:creationId xmlns:a16="http://schemas.microsoft.com/office/drawing/2014/main" id="{9E4D7094-B399-4B61-8E8E-0082EBCC4E32}"/>
+              </a:ext>
+            </a:extLst>
+          </p:cNvPr>
+          <p:cNvPicPr>
+            <a:picLocks noChangeAspect="1"/>
+          </p:cNvPicPr>
+          <p:nvPr/>
+        </p:nvPicPr>
+        <p:blipFill>
+          <a:blip r:embed="rId2"/>
+          <a:stretch>
+            <a:fillRect/>
+          </a:stretch>
+        </p:blipFill>
+        <p:spPr>
+          <a:xfrm>
+            <a:off x="822599" y="3429000"/>
+            <a:ext cx="4393559" cy="2927895"/>
+          </a:xfrm>
+          <a:prstGeom prst="rect">
+            <a:avLst/>
+          </a:prstGeom>
+        </p:spPr>
+      </p:pic>
+      <p:pic>
+        <p:nvPicPr>
+          <p:cNvPr id="7" name="Picture 6">
+            <a:extLst>
+              <a:ext uri="{FF2B5EF4-FFF2-40B4-BE49-F238E27FC236}">
+                <a16:creationId xmlns:a16="http://schemas.microsoft.com/office/drawing/2014/main" id="{9EA7E467-95ED-4724-A877-CDA3AF362700}"/>
+              </a:ext>
+            </a:extLst>
+          </p:cNvPr>
+          <p:cNvPicPr/>
+          <p:nvPr/>
+        </p:nvPicPr>
+        <p:blipFill>
+          <a:blip r:embed="rId3" cstate="print">
+            <a:extLst>
+              <a:ext uri="{28A0092B-C50C-407E-A947-70E740481C1C}">
+                <a14:useLocalDpi xmlns:a14="http://schemas.microsoft.com/office/drawing/2010/main" val="0"/>
+              </a:ext>
+            </a:extLst>
+          </a:blip>
+          <a:srcRect/>
+          <a:stretch>
+            <a:fillRect/>
+          </a:stretch>
+        </p:blipFill>
+        <p:spPr bwMode="auto">
+          <a:xfrm>
+            <a:off x="6835354" y="3314700"/>
+            <a:ext cx="4393559" cy="3152712"/>
+          </a:xfrm>
+          <a:prstGeom prst="rect">
+            <a:avLst/>
+          </a:prstGeom>
+          <a:noFill/>
+          <a:ln>
+            <a:noFill/>
+          </a:ln>
         </p:spPr>
       </p:pic>
     </p:spTree>
@@ -3606,10 +3639,10 @@
       </p:grpSpPr>
       <p:pic>
         <p:nvPicPr>
-          <p:cNvPr id="5" name="Picture 4">
-            <a:extLst>
-              <a:ext uri="{FF2B5EF4-FFF2-40B4-BE49-F238E27FC236}">
-                <a16:creationId xmlns:a16="http://schemas.microsoft.com/office/drawing/2014/main" id="{4EDB8F79-1780-4A77-B435-87282C0B1E54}"/>
+          <p:cNvPr id="4" name="Picture 3">
+            <a:extLst>
+              <a:ext uri="{FF2B5EF4-FFF2-40B4-BE49-F238E27FC236}">
+                <a16:creationId xmlns:a16="http://schemas.microsoft.com/office/drawing/2014/main" id="{31F6C226-4245-44F0-86BC-B951D1FD0412}"/>
               </a:ext>
             </a:extLst>
           </p:cNvPr>
@@ -3626,8 +3659,8 @@
         </p:blipFill>
         <p:spPr>
           <a:xfrm>
-            <a:off x="3283973" y="1294987"/>
-            <a:ext cx="5624051" cy="3728990"/>
+            <a:off x="822599" y="284615"/>
+            <a:ext cx="4393559" cy="2927895"/>
           </a:xfrm>
           <a:prstGeom prst="rect">
             <a:avLst/>
@@ -3636,20 +3669,48 @@
       </p:pic>
       <p:pic>
         <p:nvPicPr>
-          <p:cNvPr id="1026" name="Picture 2">
-            <a:extLst>
-              <a:ext uri="{FF2B5EF4-FFF2-40B4-BE49-F238E27FC236}">
-                <a16:creationId xmlns:a16="http://schemas.microsoft.com/office/drawing/2014/main" id="{D39FE0B0-FAA8-494C-8D44-B62E0CB079C1}"/>
+          <p:cNvPr id="5" name="Picture 4">
+            <a:extLst>
+              <a:ext uri="{FF2B5EF4-FFF2-40B4-BE49-F238E27FC236}">
+                <a16:creationId xmlns:a16="http://schemas.microsoft.com/office/drawing/2014/main" id="{0A41D4CC-BD27-4CF1-B1A4-E539D25D7AE6}"/>
               </a:ext>
             </a:extLst>
           </p:cNvPr>
           <p:cNvPicPr>
-            <a:picLocks noChangeAspect="1" noChangeArrowheads="1"/>
+            <a:picLocks noChangeAspect="1"/>
           </p:cNvPicPr>
           <p:nvPr/>
         </p:nvPicPr>
         <p:blipFill>
-          <a:blip r:embed="rId3">
+          <a:blip r:embed="rId2"/>
+          <a:stretch>
+            <a:fillRect/>
+          </a:stretch>
+        </p:blipFill>
+        <p:spPr>
+          <a:xfrm>
+            <a:off x="6835354" y="284615"/>
+            <a:ext cx="4393559" cy="2927895"/>
+          </a:xfrm>
+          <a:prstGeom prst="rect">
+            <a:avLst/>
+          </a:prstGeom>
+        </p:spPr>
+      </p:pic>
+      <p:pic>
+        <p:nvPicPr>
+          <p:cNvPr id="7" name="Picture 6">
+            <a:extLst>
+              <a:ext uri="{FF2B5EF4-FFF2-40B4-BE49-F238E27FC236}">
+                <a16:creationId xmlns:a16="http://schemas.microsoft.com/office/drawing/2014/main" id="{9EA7E467-95ED-4724-A877-CDA3AF362700}"/>
+              </a:ext>
+            </a:extLst>
+          </p:cNvPr>
+          <p:cNvPicPr/>
+          <p:nvPr/>
+        </p:nvPicPr>
+        <p:blipFill>
+          <a:blip r:embed="rId3" cstate="print">
             <a:extLst>
               <a:ext uri="{28A0092B-C50C-407E-A947-70E740481C1C}">
                 <a14:useLocalDpi xmlns:a14="http://schemas.microsoft.com/office/drawing/2010/main" val="0"/>
@@ -3663,22 +3724,152 @@
         </p:blipFill>
         <p:spPr bwMode="auto">
           <a:xfrm>
-            <a:off x="3733799" y="2315662"/>
-            <a:ext cx="4914900" cy="2708315"/>
+            <a:off x="6835354" y="3314700"/>
+            <a:ext cx="4393559" cy="3152712"/>
           </a:xfrm>
           <a:prstGeom prst="rect">
             <a:avLst/>
           </a:prstGeom>
           <a:noFill/>
-          <a:extLst>
-            <a:ext uri="{909E8E84-426E-40DD-AFC4-6F175D3DCCD1}">
-              <a14:hiddenFill xmlns:a14="http://schemas.microsoft.com/office/drawing/2010/main">
-                <a:solidFill>
-                  <a:srgbClr val="FFFFFF"/>
-                </a:solidFill>
-              </a14:hiddenFill>
-            </a:ext>
-          </a:extLst>
+          <a:ln>
+            <a:noFill/>
+          </a:ln>
+        </p:spPr>
+      </p:pic>
+      <p:pic>
+        <p:nvPicPr>
+          <p:cNvPr id="8" name="Picture 7">
+            <a:extLst>
+              <a:ext uri="{FF2B5EF4-FFF2-40B4-BE49-F238E27FC236}">
+                <a16:creationId xmlns:a16="http://schemas.microsoft.com/office/drawing/2014/main" id="{F85EBCAC-DC11-4E07-B9AE-14819EB95DED}"/>
+              </a:ext>
+            </a:extLst>
+          </p:cNvPr>
+          <p:cNvPicPr/>
+          <p:nvPr/>
+        </p:nvPicPr>
+        <p:blipFill>
+          <a:blip r:embed="rId3" cstate="print">
+            <a:extLst>
+              <a:ext uri="{28A0092B-C50C-407E-A947-70E740481C1C}">
+                <a14:useLocalDpi xmlns:a14="http://schemas.microsoft.com/office/drawing/2010/main" val="0"/>
+              </a:ext>
+            </a:extLst>
+          </a:blip>
+          <a:srcRect/>
+          <a:stretch>
+            <a:fillRect/>
+          </a:stretch>
+        </p:blipFill>
+        <p:spPr bwMode="auto">
+          <a:xfrm>
+            <a:off x="822599" y="3314700"/>
+            <a:ext cx="4393559" cy="3152712"/>
+          </a:xfrm>
+          <a:prstGeom prst="rect">
+            <a:avLst/>
+          </a:prstGeom>
+          <a:noFill/>
+          <a:ln>
+            <a:noFill/>
+          </a:ln>
+        </p:spPr>
+      </p:pic>
+    </p:spTree>
+    <p:extLst>
+      <p:ext uri="{BB962C8B-B14F-4D97-AF65-F5344CB8AC3E}">
+        <p14:creationId xmlns:p14="http://schemas.microsoft.com/office/powerpoint/2010/main" val="2989047975"/>
+      </p:ext>
+    </p:extLst>
+  </p:cSld>
+  <p:clrMapOvr>
+    <a:masterClrMapping/>
+  </p:clrMapOvr>
+</p:sld>
+</file>
+
+<file path=ppt/slides/slide5.xml><?xml version="1.0" encoding="utf-8"?>
+<p:sld xmlns:a="http://schemas.openxmlformats.org/drawingml/2006/main" xmlns:r="http://schemas.openxmlformats.org/officeDocument/2006/relationships" xmlns:p="http://schemas.openxmlformats.org/presentationml/2006/main">
+  <p:cSld>
+    <p:spTree>
+      <p:nvGrpSpPr>
+        <p:cNvPr id="1" name=""/>
+        <p:cNvGrpSpPr/>
+        <p:nvPr/>
+      </p:nvGrpSpPr>
+      <p:grpSpPr>
+        <a:xfrm>
+          <a:off x="0" y="0"/>
+          <a:ext cx="0" cy="0"/>
+          <a:chOff x="0" y="0"/>
+          <a:chExt cx="0" cy="0"/>
+        </a:xfrm>
+      </p:grpSpPr>
+      <p:pic>
+        <p:nvPicPr>
+          <p:cNvPr id="4" name="Picture 3">
+            <a:extLst>
+              <a:ext uri="{FF2B5EF4-FFF2-40B4-BE49-F238E27FC236}">
+                <a16:creationId xmlns:a16="http://schemas.microsoft.com/office/drawing/2014/main" id="{DDBE1284-A9E4-4FC1-A4DB-D4AC91835B7E}"/>
+              </a:ext>
+            </a:extLst>
+          </p:cNvPr>
+          <p:cNvPicPr/>
+          <p:nvPr/>
+        </p:nvPicPr>
+        <p:blipFill>
+          <a:blip r:embed="rId2"/>
+          <a:stretch>
+            <a:fillRect/>
+          </a:stretch>
+        </p:blipFill>
+        <p:spPr>
+          <a:xfrm>
+            <a:off x="1171857" y="777856"/>
+            <a:ext cx="3642190" cy="2651144"/>
+          </a:xfrm>
+          <a:prstGeom prst="rect">
+            <a:avLst/>
+          </a:prstGeom>
+        </p:spPr>
+      </p:pic>
+      <p:pic>
+        <p:nvPicPr>
+          <p:cNvPr id="6" name="Picture 5">
+            <a:extLst>
+              <a:ext uri="{FF2B5EF4-FFF2-40B4-BE49-F238E27FC236}">
+                <a16:creationId xmlns:a16="http://schemas.microsoft.com/office/drawing/2014/main" id="{7A56949F-87BD-41A8-ABD7-599882D87881}"/>
+              </a:ext>
+            </a:extLst>
+          </p:cNvPr>
+          <p:cNvPicPr/>
+          <p:nvPr/>
+        </p:nvPicPr>
+        <p:blipFill>
+          <a:blip r:embed="rId3">
+            <a:extLst>
+              <a:ext uri="{28A0092B-C50C-407E-A947-70E740481C1C}">
+                <a14:useLocalDpi xmlns:a14="http://schemas.microsoft.com/office/drawing/2010/main" val="0"/>
+              </a:ext>
+            </a:extLst>
+          </a:blip>
+          <a:srcRect/>
+          <a:stretch>
+            <a:fillRect/>
+          </a:stretch>
+        </p:blipFill>
+        <p:spPr bwMode="auto">
+          <a:xfrm>
+            <a:off x="6736975" y="641313"/>
+            <a:ext cx="3127263" cy="2787687"/>
+          </a:xfrm>
+          <a:prstGeom prst="rect">
+            <a:avLst/>
+          </a:prstGeom>
+          <a:noFill/>
+          <a:ln>
+            <a:noFill/>
+          </a:ln>
         </p:spPr>
       </p:pic>
     </p:spTree>

</xml_diff>